<commit_message>
Final Presentation + Data Pull Submission
</commit_message>
<xml_diff>
--- a/finalsubmissiondata/Parking_Performers_Final.pptx
+++ b/finalsubmissiondata/Parking_Performers_Final.pptx
@@ -560,12 +560,12 @@
         </c:dLbls>
         <c:gapWidth val="150"/>
         <c:shape val="box"/>
-        <c:axId val="1547799664"/>
-        <c:axId val="1547796400"/>
+        <c:axId val="2086397504"/>
+        <c:axId val="2086404032"/>
         <c:axId val="0"/>
       </c:bar3DChart>
       <c:catAx>
-        <c:axId val="1547799664"/>
+        <c:axId val="2086397504"/>
         <c:scaling>
           <c:orientation val="minMax"/>
         </c:scaling>
@@ -605,7 +605,7 @@
         <c:majorTickMark val="out"/>
         <c:minorTickMark val="none"/>
         <c:tickLblPos val="nextTo"/>
-        <c:crossAx val="1547796400"/>
+        <c:crossAx val="2086404032"/>
         <c:crosses val="autoZero"/>
         <c:auto val="1"/>
         <c:lblAlgn val="ctr"/>
@@ -613,7 +613,7 @@
         <c:noMultiLvlLbl val="0"/>
       </c:catAx>
       <c:valAx>
-        <c:axId val="1547796400"/>
+        <c:axId val="2086404032"/>
         <c:scaling>
           <c:orientation val="minMax"/>
         </c:scaling>
@@ -655,7 +655,7 @@
         <c:majorTickMark val="out"/>
         <c:minorTickMark val="none"/>
         <c:tickLblPos val="nextTo"/>
-        <c:crossAx val="1547799664"/>
+        <c:crossAx val="2086397504"/>
         <c:crosses val="autoZero"/>
         <c:crossBetween val="between"/>
       </c:valAx>
@@ -838,12 +838,12 @@
         </c:dLbls>
         <c:gapWidth val="150"/>
         <c:shape val="box"/>
-        <c:axId val="1547802928"/>
-        <c:axId val="1547788784"/>
+        <c:axId val="2086398592"/>
+        <c:axId val="2086406208"/>
         <c:axId val="0"/>
       </c:bar3DChart>
       <c:catAx>
-        <c:axId val="1547802928"/>
+        <c:axId val="2086398592"/>
         <c:scaling>
           <c:orientation val="minMax"/>
         </c:scaling>
@@ -863,7 +863,7 @@
             <a:endParaRPr lang="en-US"/>
           </a:p>
         </c:txPr>
-        <c:crossAx val="1547788784"/>
+        <c:crossAx val="2086406208"/>
         <c:crosses val="autoZero"/>
         <c:auto val="1"/>
         <c:lblAlgn val="ctr"/>
@@ -871,7 +871,7 @@
         <c:noMultiLvlLbl val="0"/>
       </c:catAx>
       <c:valAx>
-        <c:axId val="1547788784"/>
+        <c:axId val="2086406208"/>
         <c:scaling>
           <c:orientation val="minMax"/>
           <c:min val="0"/>
@@ -882,7 +882,7 @@
         <c:majorTickMark val="out"/>
         <c:minorTickMark val="none"/>
         <c:tickLblPos val="nextTo"/>
-        <c:crossAx val="1547802928"/>
+        <c:crossAx val="2086398592"/>
         <c:crosses val="autoZero"/>
         <c:crossBetween val="between"/>
       </c:valAx>
@@ -1096,12 +1096,12 @@
         </c:dLbls>
         <c:gapWidth val="75"/>
         <c:shape val="box"/>
-        <c:axId val="1715351568"/>
-        <c:axId val="1715347216"/>
+        <c:axId val="2086405664"/>
+        <c:axId val="2086399136"/>
         <c:axId val="0"/>
       </c:bar3DChart>
       <c:catAx>
-        <c:axId val="1715351568"/>
+        <c:axId val="2086405664"/>
         <c:scaling>
           <c:orientation val="minMax"/>
         </c:scaling>
@@ -1121,7 +1121,7 @@
             <a:endParaRPr lang="en-US"/>
           </a:p>
         </c:txPr>
-        <c:crossAx val="1715347216"/>
+        <c:crossAx val="2086399136"/>
         <c:crosses val="autoZero"/>
         <c:auto val="1"/>
         <c:lblAlgn val="ctr"/>
@@ -1129,7 +1129,7 @@
         <c:noMultiLvlLbl val="0"/>
       </c:catAx>
       <c:valAx>
-        <c:axId val="1715347216"/>
+        <c:axId val="2086399136"/>
         <c:scaling>
           <c:orientation val="minMax"/>
           <c:min val="0"/>
@@ -1140,7 +1140,7 @@
         <c:majorTickMark val="none"/>
         <c:minorTickMark val="none"/>
         <c:tickLblPos val="nextTo"/>
-        <c:crossAx val="1715351568"/>
+        <c:crossAx val="2086405664"/>
         <c:crosses val="autoZero"/>
         <c:crossBetween val="between"/>
       </c:valAx>

</xml_diff>